<commit_message>
Added file to the repo.
</commit_message>
<xml_diff>
--- a/Announcement.pptx
+++ b/Announcement.pptx
@@ -8,8 +8,9 @@
     <p:sldId id="258" r:id="rId2"/>
     <p:sldId id="259" r:id="rId3"/>
     <p:sldId id="260" r:id="rId4"/>
-    <p:sldId id="261" r:id="rId5"/>
-    <p:sldId id="262" r:id="rId6"/>
+    <p:sldId id="263" r:id="rId5"/>
+    <p:sldId id="261" r:id="rId6"/>
+    <p:sldId id="262" r:id="rId7"/>
   </p:sldIdLst>
   <p:sldSz cx="12192000" cy="6858000"/>
   <p:notesSz cx="6858000" cy="9144000"/>
@@ -263,7 +264,7 @@
           <a:p>
             <a:fld id="{6625C545-8E87-4D88-B992-41DBDA8C6E18}" type="datetimeFigureOut">
               <a:rPr lang="en-US" smtClean="0"/>
-              <a:t>25-Nov-19</a:t>
+              <a:t>26-Nov-19</a:t>
             </a:fld>
             <a:endParaRPr lang="en-US"/>
           </a:p>
@@ -461,7 +462,7 @@
           <a:p>
             <a:fld id="{6625C545-8E87-4D88-B992-41DBDA8C6E18}" type="datetimeFigureOut">
               <a:rPr lang="en-US" smtClean="0"/>
-              <a:t>25-Nov-19</a:t>
+              <a:t>26-Nov-19</a:t>
             </a:fld>
             <a:endParaRPr lang="en-US"/>
           </a:p>
@@ -669,7 +670,7 @@
           <a:p>
             <a:fld id="{6625C545-8E87-4D88-B992-41DBDA8C6E18}" type="datetimeFigureOut">
               <a:rPr lang="en-US" smtClean="0"/>
-              <a:t>25-Nov-19</a:t>
+              <a:t>26-Nov-19</a:t>
             </a:fld>
             <a:endParaRPr lang="en-US"/>
           </a:p>
@@ -1203,7 +1204,7 @@
           <a:p>
             <a:fld id="{6625C545-8E87-4D88-B992-41DBDA8C6E18}" type="datetimeFigureOut">
               <a:rPr lang="en-US" smtClean="0"/>
-              <a:t>25-Nov-19</a:t>
+              <a:t>26-Nov-19</a:t>
             </a:fld>
             <a:endParaRPr lang="en-US"/>
           </a:p>
@@ -1478,7 +1479,7 @@
           <a:p>
             <a:fld id="{6625C545-8E87-4D88-B992-41DBDA8C6E18}" type="datetimeFigureOut">
               <a:rPr lang="en-US" smtClean="0"/>
-              <a:t>25-Nov-19</a:t>
+              <a:t>26-Nov-19</a:t>
             </a:fld>
             <a:endParaRPr lang="en-US"/>
           </a:p>
@@ -1743,7 +1744,7 @@
           <a:p>
             <a:fld id="{6625C545-8E87-4D88-B992-41DBDA8C6E18}" type="datetimeFigureOut">
               <a:rPr lang="en-US" smtClean="0"/>
-              <a:t>25-Nov-19</a:t>
+              <a:t>26-Nov-19</a:t>
             </a:fld>
             <a:endParaRPr lang="en-US"/>
           </a:p>
@@ -2155,7 +2156,7 @@
           <a:p>
             <a:fld id="{6625C545-8E87-4D88-B992-41DBDA8C6E18}" type="datetimeFigureOut">
               <a:rPr lang="en-US" smtClean="0"/>
-              <a:t>25-Nov-19</a:t>
+              <a:t>26-Nov-19</a:t>
             </a:fld>
             <a:endParaRPr lang="en-US"/>
           </a:p>
@@ -2296,7 +2297,7 @@
           <a:p>
             <a:fld id="{6625C545-8E87-4D88-B992-41DBDA8C6E18}" type="datetimeFigureOut">
               <a:rPr lang="en-US" smtClean="0"/>
-              <a:t>25-Nov-19</a:t>
+              <a:t>26-Nov-19</a:t>
             </a:fld>
             <a:endParaRPr lang="en-US"/>
           </a:p>
@@ -2409,7 +2410,7 @@
           <a:p>
             <a:fld id="{6625C545-8E87-4D88-B992-41DBDA8C6E18}" type="datetimeFigureOut">
               <a:rPr lang="en-US" smtClean="0"/>
-              <a:t>25-Nov-19</a:t>
+              <a:t>26-Nov-19</a:t>
             </a:fld>
             <a:endParaRPr lang="en-US"/>
           </a:p>
@@ -2720,7 +2721,7 @@
           <a:p>
             <a:fld id="{6625C545-8E87-4D88-B992-41DBDA8C6E18}" type="datetimeFigureOut">
               <a:rPr lang="en-US" smtClean="0"/>
-              <a:t>25-Nov-19</a:t>
+              <a:t>26-Nov-19</a:t>
             </a:fld>
             <a:endParaRPr lang="en-US"/>
           </a:p>
@@ -3008,7 +3009,7 @@
           <a:p>
             <a:fld id="{6625C545-8E87-4D88-B992-41DBDA8C6E18}" type="datetimeFigureOut">
               <a:rPr lang="en-US" smtClean="0"/>
-              <a:t>25-Nov-19</a:t>
+              <a:t>26-Nov-19</a:t>
             </a:fld>
             <a:endParaRPr lang="en-US"/>
           </a:p>
@@ -3249,7 +3250,7 @@
           <a:p>
             <a:fld id="{6625C545-8E87-4D88-B992-41DBDA8C6E18}" type="datetimeFigureOut">
               <a:rPr lang="en-US" smtClean="0"/>
-              <a:t>25-Nov-19</a:t>
+              <a:t>26-Nov-19</a:t>
             </a:fld>
             <a:endParaRPr lang="en-US"/>
           </a:p>
@@ -4244,7 +4245,235 @@
         </p:nvSpPr>
         <p:spPr>
           <a:xfrm>
-            <a:off x="187569" y="-22993"/>
+            <a:off x="0" y="315326"/>
+            <a:ext cx="7148678" cy="652486"/>
+          </a:xfrm>
+          <a:prstGeom prst="rect">
+            <a:avLst/>
+          </a:prstGeom>
+        </p:spPr>
+        <p:txBody>
+          <a:bodyPr vert="horz" wrap="square" lIns="15240" tIns="7620" rIns="15240" bIns="7620" rtlCol="0" anchor="b">
+            <a:spAutoFit/>
+          </a:bodyPr>
+          <a:lstStyle>
+            <a:lvl1pPr algn="l" defTabSz="914400" rtl="0" eaLnBrk="1" latinLnBrk="0" hangingPunct="1">
+              <a:lnSpc>
+                <a:spcPct val="90000"/>
+              </a:lnSpc>
+              <a:spcBef>
+                <a:spcPct val="0"/>
+              </a:spcBef>
+              <a:buNone/>
+              <a:defRPr sz="4800" b="1" kern="1200">
+                <a:solidFill>
+                  <a:schemeClr val="bg1"/>
+                </a:solidFill>
+                <a:latin typeface="+mj-lt"/>
+                <a:ea typeface="+mj-ea"/>
+                <a:cs typeface="+mj-cs"/>
+              </a:defRPr>
+            </a:lvl1pPr>
+          </a:lstStyle>
+          <a:p>
+            <a:r>
+              <a:rPr lang="en-US" sz="4600" dirty="0"/>
+              <a:t>AI On Demand for Instructors</a:t>
+            </a:r>
+          </a:p>
+        </p:txBody>
+      </p:sp>
+      <p:sp>
+        <p:nvSpPr>
+          <p:cNvPr id="4" name="Title 1">
+            <a:extLst>
+              <a:ext uri="{FF2B5EF4-FFF2-40B4-BE49-F238E27FC236}">
+                <a16:creationId xmlns:a16="http://schemas.microsoft.com/office/drawing/2014/main" id="{BF3798BF-6260-45C7-ABFB-A1D80388E1FC}"/>
+              </a:ext>
+            </a:extLst>
+          </p:cNvPr>
+          <p:cNvSpPr txBox="1">
+            <a:spLocks/>
+          </p:cNvSpPr>
+          <p:nvPr/>
+        </p:nvSpPr>
+        <p:spPr>
+          <a:xfrm>
+            <a:off x="154084" y="4463774"/>
+            <a:ext cx="5908431" cy="624786"/>
+          </a:xfrm>
+          <a:prstGeom prst="rect">
+            <a:avLst/>
+          </a:prstGeom>
+        </p:spPr>
+        <p:txBody>
+          <a:bodyPr vert="horz" wrap="square" lIns="15240" tIns="7620" rIns="15240" bIns="7620" rtlCol="0" anchor="b">
+            <a:spAutoFit/>
+          </a:bodyPr>
+          <a:lstStyle>
+            <a:lvl1pPr algn="l" defTabSz="914400" rtl="0" eaLnBrk="1" latinLnBrk="0" hangingPunct="1">
+              <a:lnSpc>
+                <a:spcPct val="90000"/>
+              </a:lnSpc>
+              <a:spcBef>
+                <a:spcPct val="0"/>
+              </a:spcBef>
+              <a:buNone/>
+              <a:defRPr sz="4800" b="1" kern="1200">
+                <a:solidFill>
+                  <a:schemeClr val="bg1"/>
+                </a:solidFill>
+                <a:latin typeface="+mj-lt"/>
+                <a:ea typeface="+mj-ea"/>
+                <a:cs typeface="+mj-cs"/>
+              </a:defRPr>
+            </a:lvl1pPr>
+          </a:lstStyle>
+          <a:p>
+            <a:r>
+              <a:rPr lang="en-US" sz="4400" dirty="0"/>
+              <a:t>https://bit.ly/aiondemand</a:t>
+            </a:r>
+          </a:p>
+        </p:txBody>
+      </p:sp>
+      <p:pic>
+        <p:nvPicPr>
+          <p:cNvPr id="5" name="Picture 4">
+            <a:extLst>
+              <a:ext uri="{FF2B5EF4-FFF2-40B4-BE49-F238E27FC236}">
+                <a16:creationId xmlns:a16="http://schemas.microsoft.com/office/drawing/2014/main" id="{37C9D89F-739F-4F57-A3FE-4BFC3C127E27}"/>
+              </a:ext>
+            </a:extLst>
+          </p:cNvPr>
+          <p:cNvPicPr>
+            <a:picLocks noChangeAspect="1"/>
+          </p:cNvPicPr>
+          <p:nvPr/>
+        </p:nvPicPr>
+        <p:blipFill>
+          <a:blip r:embed="rId2">
+            <a:extLst>
+              <a:ext uri="{28A0092B-C50C-407E-A947-70E740481C1C}">
+                <a14:useLocalDpi xmlns:a14="http://schemas.microsoft.com/office/drawing/2010/main"/>
+              </a:ext>
+            </a:extLst>
+          </a:blip>
+          <a:stretch>
+            <a:fillRect/>
+          </a:stretch>
+        </p:blipFill>
+        <p:spPr>
+          <a:xfrm>
+            <a:off x="7234646" y="2137234"/>
+            <a:ext cx="4712326" cy="3248327"/>
+          </a:xfrm>
+          <a:prstGeom prst="rect">
+            <a:avLst/>
+          </a:prstGeom>
+        </p:spPr>
+      </p:pic>
+      <p:sp>
+        <p:nvSpPr>
+          <p:cNvPr id="6" name="Title 1">
+            <a:extLst>
+              <a:ext uri="{FF2B5EF4-FFF2-40B4-BE49-F238E27FC236}">
+                <a16:creationId xmlns:a16="http://schemas.microsoft.com/office/drawing/2014/main" id="{244A2B8B-DE34-4558-8925-D9C71B33F1C3}"/>
+              </a:ext>
+            </a:extLst>
+          </p:cNvPr>
+          <p:cNvSpPr txBox="1">
+            <a:spLocks/>
+          </p:cNvSpPr>
+          <p:nvPr/>
+        </p:nvSpPr>
+        <p:spPr>
+          <a:xfrm>
+            <a:off x="620123" y="2394226"/>
+            <a:ext cx="5908431" cy="513987"/>
+          </a:xfrm>
+          <a:prstGeom prst="rect">
+            <a:avLst/>
+          </a:prstGeom>
+        </p:spPr>
+        <p:txBody>
+          <a:bodyPr vert="horz" wrap="square" lIns="15240" tIns="7620" rIns="15240" bIns="7620" rtlCol="0" anchor="b">
+            <a:spAutoFit/>
+          </a:bodyPr>
+          <a:lstStyle>
+            <a:lvl1pPr algn="l" defTabSz="914400" rtl="0" eaLnBrk="1" latinLnBrk="0" hangingPunct="1">
+              <a:lnSpc>
+                <a:spcPct val="90000"/>
+              </a:lnSpc>
+              <a:spcBef>
+                <a:spcPct val="0"/>
+              </a:spcBef>
+              <a:buNone/>
+              <a:defRPr sz="4800" b="1" kern="1200">
+                <a:solidFill>
+                  <a:schemeClr val="bg1"/>
+                </a:solidFill>
+                <a:latin typeface="+mj-lt"/>
+                <a:ea typeface="+mj-ea"/>
+                <a:cs typeface="+mj-cs"/>
+              </a:defRPr>
+            </a:lvl1pPr>
+          </a:lstStyle>
+          <a:p>
+            <a:r>
+              <a:rPr lang="en-US" sz="3600" dirty="0"/>
+              <a:t>Register your interest:</a:t>
+            </a:r>
+          </a:p>
+        </p:txBody>
+      </p:sp>
+    </p:spTree>
+    <p:extLst>
+      <p:ext uri="{BB962C8B-B14F-4D97-AF65-F5344CB8AC3E}">
+        <p14:creationId xmlns:p14="http://schemas.microsoft.com/office/powerpoint/2010/main" val="459347553"/>
+      </p:ext>
+    </p:extLst>
+  </p:cSld>
+  <p:clrMapOvr>
+    <a:masterClrMapping/>
+  </p:clrMapOvr>
+</p:sld>
+</file>
+
+<file path=ppt/slides/slide5.xml><?xml version="1.0" encoding="utf-8"?>
+<p:sld xmlns:a="http://schemas.openxmlformats.org/drawingml/2006/main" xmlns:r="http://schemas.openxmlformats.org/officeDocument/2006/relationships" xmlns:p="http://schemas.openxmlformats.org/presentationml/2006/main">
+  <p:cSld>
+    <p:spTree>
+      <p:nvGrpSpPr>
+        <p:cNvPr id="1" name=""/>
+        <p:cNvGrpSpPr/>
+        <p:nvPr/>
+      </p:nvGrpSpPr>
+      <p:grpSpPr>
+        <a:xfrm>
+          <a:off x="0" y="0"/>
+          <a:ext cx="0" cy="0"/>
+          <a:chOff x="0" y="0"/>
+          <a:chExt cx="0" cy="0"/>
+        </a:xfrm>
+      </p:grpSpPr>
+      <p:sp>
+        <p:nvSpPr>
+          <p:cNvPr id="3" name="Title 1">
+            <a:extLst>
+              <a:ext uri="{FF2B5EF4-FFF2-40B4-BE49-F238E27FC236}">
+                <a16:creationId xmlns:a16="http://schemas.microsoft.com/office/drawing/2014/main" id="{83BA9E9C-7140-41EC-93C6-63A026ED594C}"/>
+              </a:ext>
+            </a:extLst>
+          </p:cNvPr>
+          <p:cNvSpPr txBox="1">
+            <a:spLocks/>
+          </p:cNvSpPr>
+          <p:nvPr/>
+        </p:nvSpPr>
+        <p:spPr>
+          <a:xfrm>
+            <a:off x="520078" y="531189"/>
             <a:ext cx="6409924" cy="1344984"/>
           </a:xfrm>
           <a:prstGeom prst="rect">
@@ -4402,7 +4631,7 @@
 </p:sld>
 </file>
 
-<file path=ppt/slides/slide5.xml><?xml version="1.0" encoding="utf-8"?>
+<file path=ppt/slides/slide6.xml><?xml version="1.0" encoding="utf-8"?>
 <p:sld xmlns:a="http://schemas.openxmlformats.org/drawingml/2006/main" xmlns:r="http://schemas.openxmlformats.org/officeDocument/2006/relationships" xmlns:p="http://schemas.openxmlformats.org/presentationml/2006/main">
   <p:cSld>
     <p:spTree>

</xml_diff>